<commit_message>
powerpoint modified, ready for presentation
</commit_message>
<xml_diff>
--- a/NEO.pptx
+++ b/NEO.pptx
@@ -11,8 +11,8 @@
     <p:sldId id="256" r:id="rId2"/>
     <p:sldId id="257" r:id="rId3"/>
     <p:sldId id="259" r:id="rId4"/>
-    <p:sldId id="258" r:id="rId5"/>
-    <p:sldId id="260" r:id="rId6"/>
+    <p:sldId id="261" r:id="rId5"/>
+    <p:sldId id="262" r:id="rId6"/>
   </p:sldIdLst>
   <p:sldSz cx="9144000" cy="5143500" type="screen16x9"/>
   <p:notesSz cx="6858000" cy="9144000"/>
@@ -523,7 +523,16 @@
           <a:bodyPr/>
           <a:lstStyle/>
           <a:p>
-            <a:endParaRPr lang="en-US"/>
+            <a:r>
+              <a:rPr lang="en-US" dirty="0"/>
+              <a:t>Slide 1/6</a:t>
+            </a:r>
+          </a:p>
+          <a:p>
+            <a:r>
+              <a:rPr lang="en-US" dirty="0"/>
+              <a:t>This is final slide less styling</a:t>
+            </a:r>
           </a:p>
         </p:txBody>
       </p:sp>
@@ -534,7 +543,7 @@
             <a:spLocks noGrp="1"/>
           </p:cNvSpPr>
           <p:nvPr>
-            <p:ph type="sldNum" sz="quarter" idx="10"/>
+            <p:ph type="sldNum" sz="quarter" idx="5"/>
           </p:nvPr>
         </p:nvSpPr>
         <p:spPr/>
@@ -542,7 +551,1621 @@
           <a:bodyPr/>
           <a:lstStyle/>
           <a:p>
-            <a:fld id="{87350B06-B074-48FC-8CFD-53D2CD8FB95F}" type="slidenum">
+            <a:fld id="{AF533E96-F078-4B3D-A8F4-F1AF21EBC357}" type="slidenum">
+              <a:rPr lang="en-US" smtClean="0"/>
+              <a:t>1</a:t>
+            </a:fld>
+            <a:endParaRPr lang="en-US"/>
+          </a:p>
+        </p:txBody>
+      </p:sp>
+    </p:spTree>
+    <p:extLst>
+      <p:ext uri="{BB962C8B-B14F-4D97-AF65-F5344CB8AC3E}">
+        <p14:creationId xmlns:p14="http://schemas.microsoft.com/office/powerpoint/2010/main" val="1164017096"/>
+      </p:ext>
+    </p:extLst>
+  </p:cSld>
+  <p:clrMapOvr>
+    <a:masterClrMapping/>
+  </p:clrMapOvr>
+</p:notes>
+</file>
+
+<file path=ppt/notesSlides/notesSlide2.xml><?xml version="1.0" encoding="utf-8"?>
+<p:notes xmlns:a="http://schemas.openxmlformats.org/drawingml/2006/main" xmlns:r="http://schemas.openxmlformats.org/officeDocument/2006/relationships" xmlns:p="http://schemas.openxmlformats.org/presentationml/2006/main">
+  <p:cSld>
+    <p:spTree>
+      <p:nvGrpSpPr>
+        <p:cNvPr id="1" name=""/>
+        <p:cNvGrpSpPr/>
+        <p:nvPr/>
+      </p:nvGrpSpPr>
+      <p:grpSpPr>
+        <a:xfrm>
+          <a:off x="0" y="0"/>
+          <a:ext cx="0" cy="0"/>
+          <a:chOff x="0" y="0"/>
+          <a:chExt cx="0" cy="0"/>
+        </a:xfrm>
+      </p:grpSpPr>
+      <p:sp>
+        <p:nvSpPr>
+          <p:cNvPr id="2" name="Slide Image Placeholder 1"/>
+          <p:cNvSpPr>
+            <a:spLocks noGrp="1" noRot="1" noChangeAspect="1"/>
+          </p:cNvSpPr>
+          <p:nvPr>
+            <p:ph type="sldImg"/>
+          </p:nvPr>
+        </p:nvSpPr>
+        <p:spPr/>
+      </p:sp>
+      <p:sp>
+        <p:nvSpPr>
+          <p:cNvPr id="3" name="Notes Placeholder 2"/>
+          <p:cNvSpPr>
+            <a:spLocks noGrp="1"/>
+          </p:cNvSpPr>
+          <p:nvPr>
+            <p:ph type="body" idx="1"/>
+          </p:nvPr>
+        </p:nvSpPr>
+        <p:spPr/>
+        <p:txBody>
+          <a:bodyPr/>
+          <a:lstStyle/>
+          <a:p>
+            <a:r>
+              <a:rPr lang="en-US" dirty="0"/>
+              <a:t>10 words per slide!!</a:t>
+            </a:r>
+          </a:p>
+          <a:p>
+            <a:endParaRPr lang="en-US" dirty="0"/>
+          </a:p>
+          <a:p>
+            <a:r>
+              <a:rPr lang="en-US" dirty="0"/>
+              <a:t>Home View... What can be said, and what are the most important 10 words of that whole thing?</a:t>
+            </a:r>
+          </a:p>
+          <a:p>
+            <a:endParaRPr lang="en-US" dirty="0"/>
+          </a:p>
+          <a:p>
+            <a:pPr marL="171450" indent="-171450">
+              <a:buFontTx/>
+              <a:buChar char="-"/>
+            </a:pPr>
+            <a:r>
+              <a:rPr lang="en-US" dirty="0"/>
+              <a:t>Styling -&gt; @ng-material/ng-material for sidenav, toolbar, button styling</a:t>
+            </a:r>
+          </a:p>
+          <a:p>
+            <a:pPr marL="628650" lvl="1" indent="-171450">
+              <a:buFontTx/>
+              <a:buChar char="-"/>
+            </a:pPr>
+            <a:r>
+              <a:rPr lang="en-US" dirty="0"/>
+              <a:t>Material Design inspired dark-mode color theme and component design</a:t>
+            </a:r>
+          </a:p>
+          <a:p>
+            <a:pPr marL="171450" lvl="0" indent="-171450">
+              <a:buFontTx/>
+              <a:buChar char="-"/>
+            </a:pPr>
+            <a:r>
+              <a:rPr lang="en-US" i="1" dirty="0"/>
+              <a:t>onClickScroll() {}</a:t>
+            </a:r>
+            <a:endParaRPr lang="en-US" i="0" dirty="0"/>
+          </a:p>
+          <a:p>
+            <a:pPr marL="628650" lvl="1" indent="-171450">
+              <a:buFontTx/>
+              <a:buChar char="-"/>
+            </a:pPr>
+            <a:r>
+              <a:rPr lang="en-US" i="0" dirty="0"/>
+              <a:t>Event raised by the arrow down button</a:t>
+            </a:r>
+          </a:p>
+          <a:p>
+            <a:pPr marL="628650" lvl="1" indent="-171450">
+              <a:buFontTx/>
+              <a:buChar char="-"/>
+            </a:pPr>
+            <a:r>
+              <a:rPr lang="en-US" i="0" dirty="0"/>
+              <a:t>Uses Angular ViewportScroller as dependency</a:t>
+            </a:r>
+          </a:p>
+          <a:p>
+            <a:pPr marL="628650" lvl="1" indent="-171450">
+              <a:buFontTx/>
+              <a:buChar char="-"/>
+            </a:pPr>
+            <a:r>
+              <a:rPr lang="en-US" i="0" dirty="0"/>
+              <a:t>Scrolls to anchor id</a:t>
+            </a:r>
+          </a:p>
+          <a:p>
+            <a:pPr marL="1085850" lvl="2" indent="-171450">
+              <a:buFontTx/>
+              <a:buChar char="-"/>
+            </a:pPr>
+            <a:r>
+              <a:rPr lang="en-US" i="0" dirty="0"/>
+              <a:t>Problems: not smooth scroll</a:t>
+            </a:r>
+          </a:p>
+          <a:p>
+            <a:pPr marL="1085850" lvl="2" indent="-171450">
+              <a:buFontTx/>
+              <a:buChar char="-"/>
+            </a:pPr>
+            <a:r>
+              <a:rPr lang="en-US" i="0" dirty="0"/>
+              <a:t>Solution: implement smooth scrolling</a:t>
+            </a:r>
+          </a:p>
+          <a:p>
+            <a:pPr marL="0" lvl="0" indent="0">
+              <a:buFontTx/>
+              <a:buNone/>
+            </a:pPr>
+            <a:endParaRPr lang="en-US" i="0" dirty="0"/>
+          </a:p>
+          <a:p>
+            <a:pPr marL="0" lvl="0" indent="0">
+              <a:buFontTx/>
+              <a:buNone/>
+            </a:pPr>
+            <a:r>
+              <a:rPr lang="en-US" i="0" dirty="0"/>
+              <a:t>That is all MeteoriteContainerComponent.</a:t>
+            </a:r>
+          </a:p>
+          <a:p>
+            <a:pPr marL="0" lvl="0" indent="0">
+              <a:buFontTx/>
+              <a:buNone/>
+            </a:pPr>
+            <a:endParaRPr lang="en-US" i="0" dirty="0"/>
+          </a:p>
+          <a:p>
+            <a:pPr marL="171450" lvl="0" indent="-171450">
+              <a:buFontTx/>
+              <a:buChar char="-"/>
+            </a:pPr>
+            <a:r>
+              <a:rPr lang="en-US" i="0" dirty="0"/>
+              <a:t>Meteorites follow interface Imeteorite or Imeteorite[] </a:t>
+            </a:r>
+          </a:p>
+          <a:p>
+            <a:pPr marL="171450" lvl="0" indent="-171450">
+              <a:buFontTx/>
+              <a:buChar char="-"/>
+            </a:pPr>
+            <a:r>
+              <a:rPr lang="en-US" i="0" dirty="0"/>
+              <a:t>Filter toggle and sorting toggle -&gt; dispatch services to handle filter/sort functions</a:t>
+            </a:r>
+          </a:p>
+          <a:p>
+            <a:pPr marL="628650" lvl="1" indent="-171450">
+              <a:buFontTx/>
+              <a:buChar char="-"/>
+            </a:pPr>
+            <a:r>
+              <a:rPr lang="en-US" i="0" dirty="0"/>
+              <a:t>These services were added to open the door for additional sorting/filtering functionality here, or anywhere else in the application</a:t>
+            </a:r>
+          </a:p>
+          <a:p>
+            <a:pPr marL="628650" lvl="1" indent="-171450">
+              <a:buFontTx/>
+              <a:buChar char="-"/>
+            </a:pPr>
+            <a:r>
+              <a:rPr lang="en-US" i="0" dirty="0"/>
+              <a:t>Weaknesses: Filtering service is tightly coupled to the Imeteorite interface</a:t>
+            </a:r>
+          </a:p>
+          <a:p>
+            <a:pPr marL="628650" lvl="1" indent="-171450">
+              <a:buFontTx/>
+              <a:buChar char="-"/>
+            </a:pPr>
+            <a:r>
+              <a:rPr lang="en-US" i="0" dirty="0"/>
+              <a:t>Solution: Use generics to open up the acceptable types, accept Array&lt;string | number&gt; rather than just Array&lt;object | Imeteorite&gt;</a:t>
+            </a:r>
+          </a:p>
+          <a:p>
+            <a:pPr marL="1085850" lvl="2" indent="-171450">
+              <a:buFontTx/>
+              <a:buChar char="-"/>
+            </a:pPr>
+            <a:r>
+              <a:rPr lang="en-US" i="0" dirty="0"/>
+              <a:t>Imeteorite specific sorting should come from a class outside of the filtering service, that service should only handle filtering</a:t>
+            </a:r>
+          </a:p>
+          <a:p>
+            <a:pPr marL="1085850" lvl="2" indent="-171450">
+              <a:buFontTx/>
+              <a:buChar char="-"/>
+            </a:pPr>
+            <a:r>
+              <a:rPr lang="en-US" i="0" dirty="0"/>
+              <a:t>I don’t mind the passing in of the filtering object, again, the specifics for filtering a meteorite interface could come in the form of an optional argument added to the filtering object interface </a:t>
+            </a:r>
+            <a:r>
+              <a:rPr lang="en-US" b="1" i="1" dirty="0"/>
+              <a:t>do this if there is time</a:t>
+            </a:r>
+            <a:endParaRPr lang="en-US" b="0" i="1" dirty="0"/>
+          </a:p>
+          <a:p>
+            <a:pPr marL="171450" lvl="0" indent="-171450">
+              <a:buFontTx/>
+              <a:buChar char="-"/>
+            </a:pPr>
+            <a:r>
+              <a:rPr lang="en-US" b="1" i="1" dirty="0"/>
+              <a:t>Point of Interest</a:t>
+            </a:r>
+            <a:r>
+              <a:rPr lang="en-US" b="0" i="0" dirty="0"/>
+              <a:t>: Sorting Service utilized here</a:t>
+            </a:r>
+          </a:p>
+          <a:p>
+            <a:pPr marL="628650" lvl="1" indent="-171450">
+              <a:buFontTx/>
+              <a:buChar char="-"/>
+            </a:pPr>
+            <a:r>
+              <a:rPr lang="en-US" b="0" i="0" dirty="0"/>
+              <a:t>This uses function type definition to ensure that the arguments passed in are an object[] and it’s key.</a:t>
+            </a:r>
+          </a:p>
+          <a:p>
+            <a:pPr marL="628650" lvl="1" indent="-171450">
+              <a:buFontTx/>
+              <a:buChar char="-"/>
+            </a:pPr>
+            <a:r>
+              <a:rPr lang="en-US" b="0" i="0" dirty="0"/>
+              <a:t>Advanced TypeScript functionality that can be extended to other parts of the app to assist in creating looser coupling between functional classes and application features</a:t>
+            </a:r>
+          </a:p>
+          <a:p>
+            <a:pPr marL="171450" lvl="0" indent="-171450">
+              <a:buFontTx/>
+              <a:buChar char="-"/>
+            </a:pPr>
+            <a:r>
+              <a:rPr lang="en-US" b="0" i="0" dirty="0"/>
+              <a:t>The returned Observable stream from the get request is “immutable” -&gt; copied to </a:t>
+            </a:r>
+            <a:r>
+              <a:rPr lang="en-US" b="0" i="0" dirty="0" err="1"/>
+              <a:t>visiblemeteorites</a:t>
+            </a:r>
+            <a:r>
+              <a:rPr lang="en-US" b="0" i="0" dirty="0"/>
+              <a:t> which is mutated in order to alter the views on the screen</a:t>
+            </a:r>
+          </a:p>
+          <a:p>
+            <a:pPr marL="171450" lvl="0" indent="-171450">
+              <a:buFontTx/>
+              <a:buChar char="-"/>
+            </a:pPr>
+            <a:r>
+              <a:rPr lang="en-US" b="0" i="0" dirty="0"/>
+              <a:t>Tooltips added to provide some explanation for how to use the application without adding additional DOM elements to take up space</a:t>
+            </a:r>
+          </a:p>
+          <a:p>
+            <a:pPr marL="171450" lvl="0" indent="-171450">
+              <a:buFontTx/>
+              <a:buChar char="-"/>
+            </a:pPr>
+            <a:r>
+              <a:rPr lang="en-US" b="0" i="0" dirty="0"/>
+              <a:t>Went for simple design</a:t>
+            </a:r>
+          </a:p>
+          <a:p>
+            <a:pPr marL="171450" lvl="0" indent="-171450">
+              <a:buFontTx/>
+              <a:buChar char="-"/>
+            </a:pPr>
+            <a:r>
+              <a:rPr lang="en-US" b="0" i="0" dirty="0" err="1"/>
+              <a:t>ngClass</a:t>
+            </a:r>
+            <a:r>
+              <a:rPr lang="en-US" b="0" i="0" dirty="0"/>
+              <a:t> used to alter styling of the show/hide button based on </a:t>
+            </a:r>
+            <a:r>
+              <a:rPr lang="en-US" b="1" i="0" dirty="0"/>
+              <a:t>component-level state</a:t>
+            </a:r>
+            <a:endParaRPr lang="en-US" b="0" i="0" dirty="0"/>
+          </a:p>
+          <a:p>
+            <a:pPr marL="171450" lvl="0" indent="-171450">
+              <a:buFontTx/>
+              <a:buChar char="-"/>
+            </a:pPr>
+            <a:endParaRPr lang="en-US" b="0" i="0" dirty="0"/>
+          </a:p>
+          <a:p>
+            <a:pPr marL="0" lvl="0" indent="0">
+              <a:buFontTx/>
+              <a:buNone/>
+            </a:pPr>
+            <a:r>
+              <a:rPr lang="en-US" b="0" i="0" dirty="0"/>
+              <a:t>NOTE this is not a high-level overview. Here, I should talk about the website, not the actual components, so I’ll come back to all this technical stuff.</a:t>
+            </a:r>
+          </a:p>
+          <a:p>
+            <a:pPr marL="0" lvl="0" indent="0">
+              <a:buFontTx/>
+              <a:buNone/>
+            </a:pPr>
+            <a:r>
+              <a:rPr lang="en-US" b="0" i="0" dirty="0"/>
+              <a:t>What can you </a:t>
+            </a:r>
+            <a:r>
+              <a:rPr lang="en-US" b="0" i="1" dirty="0"/>
+              <a:t>see </a:t>
+            </a:r>
+            <a:r>
+              <a:rPr lang="en-US" b="0" i="0" dirty="0"/>
+              <a:t>on the screen?</a:t>
+            </a:r>
+          </a:p>
+          <a:p>
+            <a:pPr marL="0" lvl="0" indent="0">
+              <a:buFontTx/>
+              <a:buNone/>
+            </a:pPr>
+            <a:endParaRPr lang="en-US" b="0" i="0" dirty="0"/>
+          </a:p>
+          <a:p>
+            <a:pPr marL="171450" lvl="0" indent="-171450">
+              <a:buFontTx/>
+              <a:buChar char="-"/>
+            </a:pPr>
+            <a:r>
+              <a:rPr lang="en-US" b="0" i="0" dirty="0"/>
+              <a:t>Color scheme -&gt; the design</a:t>
+            </a:r>
+          </a:p>
+          <a:p>
+            <a:pPr marL="171450" lvl="0" indent="-171450">
+              <a:buFontTx/>
+              <a:buChar char="-"/>
+            </a:pPr>
+            <a:r>
+              <a:rPr lang="en-US" b="0" i="0" dirty="0"/>
+              <a:t>The user experience, what </a:t>
+            </a:r>
+            <a:r>
+              <a:rPr lang="en-US" b="0" i="1" dirty="0"/>
+              <a:t>the user does</a:t>
+            </a:r>
+            <a:r>
+              <a:rPr lang="en-US" b="0" i="0" dirty="0"/>
+              <a:t>  with the website  </a:t>
+            </a:r>
+          </a:p>
+          <a:p>
+            <a:pPr marL="171450" lvl="0" indent="-171450">
+              <a:buFontTx/>
+              <a:buChar char="-"/>
+            </a:pPr>
+            <a:endParaRPr lang="en-US" b="0" i="0" dirty="0"/>
+          </a:p>
+          <a:p>
+            <a:pPr marL="0" lvl="0" indent="0">
+              <a:buFontTx/>
+              <a:buNone/>
+            </a:pPr>
+            <a:r>
+              <a:rPr lang="en-US" b="0" i="0" dirty="0"/>
+              <a:t>You click the down button to reach the first feature.</a:t>
+            </a:r>
+          </a:p>
+          <a:p>
+            <a:pPr marL="0" lvl="0" indent="0">
+              <a:buFontTx/>
+              <a:buNone/>
+            </a:pPr>
+            <a:r>
+              <a:rPr lang="en-US" b="0" i="0" dirty="0"/>
+              <a:t>You can toggle the meteorite list with the show/hide button, which changes style based on component state.</a:t>
+            </a:r>
+          </a:p>
+          <a:p>
+            <a:pPr marL="0" lvl="0" indent="0">
+              <a:buFontTx/>
+              <a:buNone/>
+            </a:pPr>
+            <a:r>
+              <a:rPr lang="en-US" b="0" i="0" dirty="0"/>
+              <a:t>There is a filtering and sorting functionality, and it’s general function is revealed through the tooltips, where hovering over the meteorites provides similar information that is already on the screen, but in a more human-readable way.</a:t>
+            </a:r>
+          </a:p>
+          <a:p>
+            <a:pPr marL="0" lvl="0" indent="0">
+              <a:buFontTx/>
+              <a:buNone/>
+            </a:pPr>
+            <a:endParaRPr lang="en-US" b="0" i="0" dirty="0"/>
+          </a:p>
+          <a:p>
+            <a:pPr marL="0" lvl="0" indent="0">
+              <a:buFontTx/>
+              <a:buNone/>
+            </a:pPr>
+            <a:r>
+              <a:rPr lang="en-US" b="0" i="0" dirty="0"/>
+              <a:t>This is the first interaction with the sidenav, which is a component used from Angular Material. The buttons, toolbar, tooltips also come from there, and I followed Material Design’s guidelines for creating a dark mode theme.</a:t>
+            </a:r>
+            <a:endParaRPr lang="en-US" b="1" i="1" dirty="0"/>
+          </a:p>
+        </p:txBody>
+      </p:sp>
+      <p:sp>
+        <p:nvSpPr>
+          <p:cNvPr id="4" name="Slide Number Placeholder 3"/>
+          <p:cNvSpPr>
+            <a:spLocks noGrp="1"/>
+          </p:cNvSpPr>
+          <p:nvPr>
+            <p:ph type="sldNum" sz="quarter" idx="5"/>
+          </p:nvPr>
+        </p:nvSpPr>
+        <p:spPr/>
+        <p:txBody>
+          <a:bodyPr/>
+          <a:lstStyle/>
+          <a:p>
+            <a:fld id="{AF533E96-F078-4B3D-A8F4-F1AF21EBC357}" type="slidenum">
+              <a:rPr lang="en-US" smtClean="0"/>
+              <a:t>2</a:t>
+            </a:fld>
+            <a:endParaRPr lang="en-US"/>
+          </a:p>
+        </p:txBody>
+      </p:sp>
+    </p:spTree>
+    <p:extLst>
+      <p:ext uri="{BB962C8B-B14F-4D97-AF65-F5344CB8AC3E}">
+        <p14:creationId xmlns:p14="http://schemas.microsoft.com/office/powerpoint/2010/main" val="2956102294"/>
+      </p:ext>
+    </p:extLst>
+  </p:cSld>
+  <p:clrMapOvr>
+    <a:masterClrMapping/>
+  </p:clrMapOvr>
+</p:notes>
+</file>
+
+<file path=ppt/notesSlides/notesSlide3.xml><?xml version="1.0" encoding="utf-8"?>
+<p:notes xmlns:a="http://schemas.openxmlformats.org/drawingml/2006/main" xmlns:r="http://schemas.openxmlformats.org/officeDocument/2006/relationships" xmlns:p="http://schemas.openxmlformats.org/presentationml/2006/main">
+  <p:cSld>
+    <p:spTree>
+      <p:nvGrpSpPr>
+        <p:cNvPr id="1" name=""/>
+        <p:cNvGrpSpPr/>
+        <p:nvPr/>
+      </p:nvGrpSpPr>
+      <p:grpSpPr>
+        <a:xfrm>
+          <a:off x="0" y="0"/>
+          <a:ext cx="0" cy="0"/>
+          <a:chOff x="0" y="0"/>
+          <a:chExt cx="0" cy="0"/>
+        </a:xfrm>
+      </p:grpSpPr>
+      <p:sp>
+        <p:nvSpPr>
+          <p:cNvPr id="2" name="Slide Image Placeholder 1"/>
+          <p:cNvSpPr>
+            <a:spLocks noGrp="1" noRot="1" noChangeAspect="1"/>
+          </p:cNvSpPr>
+          <p:nvPr>
+            <p:ph type="sldImg"/>
+          </p:nvPr>
+        </p:nvSpPr>
+        <p:spPr/>
+      </p:sp>
+      <p:sp>
+        <p:nvSpPr>
+          <p:cNvPr id="3" name="Notes Placeholder 2"/>
+          <p:cNvSpPr>
+            <a:spLocks noGrp="1"/>
+          </p:cNvSpPr>
+          <p:nvPr>
+            <p:ph type="body" idx="1"/>
+          </p:nvPr>
+        </p:nvSpPr>
+        <p:spPr/>
+        <p:txBody>
+          <a:bodyPr/>
+          <a:lstStyle/>
+          <a:p>
+            <a:pPr marL="171450" indent="-171450">
+              <a:buFontTx/>
+              <a:buChar char="-"/>
+            </a:pPr>
+            <a:r>
+              <a:rPr lang="en-US" dirty="0"/>
+              <a:t>Responsive grid -&gt; custom directive and service interaction</a:t>
+            </a:r>
+          </a:p>
+          <a:p>
+            <a:pPr marL="0" indent="0">
+              <a:buFontTx/>
+              <a:buNone/>
+            </a:pPr>
+            <a:r>
+              <a:rPr lang="en-US" b="1" dirty="0"/>
+              <a:t>NOTE: </a:t>
+            </a:r>
+            <a:r>
+              <a:rPr lang="en-US" b="0" dirty="0"/>
+              <a:t>change the breakpoints object from service to component-provided or </a:t>
+            </a:r>
+            <a:r>
+              <a:rPr lang="en-US" b="0" dirty="0" err="1"/>
+              <a:t>util</a:t>
+            </a:r>
+            <a:r>
+              <a:rPr lang="en-US" b="0" dirty="0"/>
+              <a:t> if time allows</a:t>
+            </a:r>
+          </a:p>
+          <a:p>
+            <a:pPr marL="0" indent="0">
+              <a:buFontTx/>
+              <a:buNone/>
+            </a:pPr>
+            <a:r>
+              <a:rPr lang="en-US" b="0" dirty="0"/>
+              <a:t>with that, issue: shouldn’t accept the breakpoints through DI, should be through another class, and as a library this will need to be provided from the developer, and will have default values.</a:t>
+            </a:r>
+          </a:p>
+          <a:p>
+            <a:pPr marL="171450" indent="-171450">
+              <a:buFontTx/>
+              <a:buChar char="-"/>
+            </a:pPr>
+            <a:r>
+              <a:rPr lang="en-US" b="0" dirty="0"/>
+              <a:t>Retrieves 12 images from the server on a 12-day look back</a:t>
+            </a:r>
+          </a:p>
+          <a:p>
+            <a:pPr marL="171450" indent="-171450">
+              <a:buFontTx/>
+              <a:buChar char="-"/>
+            </a:pPr>
+            <a:r>
+              <a:rPr lang="en-US" b="0" dirty="0"/>
+              <a:t>Click to see detail view -&gt; full-page image, description, title, back button</a:t>
+            </a:r>
+          </a:p>
+          <a:p>
+            <a:pPr marL="0" indent="0">
+              <a:buFontTx/>
+              <a:buNone/>
+            </a:pPr>
+            <a:endParaRPr lang="en-US" b="0" dirty="0"/>
+          </a:p>
+          <a:p>
+            <a:pPr marL="0" indent="0">
+              <a:buFontTx/>
+              <a:buNone/>
+            </a:pPr>
+            <a:r>
+              <a:rPr lang="en-US" b="1" dirty="0"/>
+              <a:t>Detail View</a:t>
+            </a:r>
+            <a:endParaRPr lang="en-US" b="0" dirty="0"/>
+          </a:p>
+          <a:p>
+            <a:pPr marL="0" indent="0">
+              <a:buFontTx/>
+              <a:buNone/>
+            </a:pPr>
+            <a:r>
+              <a:rPr lang="en-US" b="0" dirty="0"/>
+              <a:t>Will be part of this slide (only get 6, this is 3)</a:t>
+            </a:r>
+          </a:p>
+          <a:p>
+            <a:pPr marL="0" indent="0">
+              <a:buFontTx/>
+              <a:buNone/>
+            </a:pPr>
+            <a:r>
+              <a:rPr lang="en-US" b="0" dirty="0"/>
+              <a:t>Self-explanatory, has a route, goes back to astronomy images</a:t>
+            </a:r>
+          </a:p>
+          <a:p>
+            <a:pPr marL="0" indent="0">
+              <a:buFontTx/>
+              <a:buNone/>
+            </a:pPr>
+            <a:r>
+              <a:rPr lang="en-US" b="1" dirty="0"/>
+              <a:t>interesting about this view</a:t>
+            </a:r>
+            <a:r>
+              <a:rPr lang="en-US" b="0" dirty="0"/>
+              <a:t>: The date is used as the ID for routing</a:t>
+            </a:r>
+            <a:endParaRPr lang="en-US" b="1" dirty="0"/>
+          </a:p>
+        </p:txBody>
+      </p:sp>
+      <p:sp>
+        <p:nvSpPr>
+          <p:cNvPr id="4" name="Slide Number Placeholder 3"/>
+          <p:cNvSpPr>
+            <a:spLocks noGrp="1"/>
+          </p:cNvSpPr>
+          <p:nvPr>
+            <p:ph type="sldNum" sz="quarter" idx="5"/>
+          </p:nvPr>
+        </p:nvSpPr>
+        <p:spPr/>
+        <p:txBody>
+          <a:bodyPr/>
+          <a:lstStyle/>
+          <a:p>
+            <a:fld id="{AF533E96-F078-4B3D-A8F4-F1AF21EBC357}" type="slidenum">
+              <a:rPr lang="en-US" smtClean="0"/>
+              <a:t>3</a:t>
+            </a:fld>
+            <a:endParaRPr lang="en-US"/>
+          </a:p>
+        </p:txBody>
+      </p:sp>
+    </p:spTree>
+    <p:extLst>
+      <p:ext uri="{BB962C8B-B14F-4D97-AF65-F5344CB8AC3E}">
+        <p14:creationId xmlns:p14="http://schemas.microsoft.com/office/powerpoint/2010/main" val="4125486417"/>
+      </p:ext>
+    </p:extLst>
+  </p:cSld>
+  <p:clrMapOvr>
+    <a:masterClrMapping/>
+  </p:clrMapOvr>
+</p:notes>
+</file>
+
+<file path=ppt/notesSlides/notesSlide4.xml><?xml version="1.0" encoding="utf-8"?>
+<p:notes xmlns:a="http://schemas.openxmlformats.org/drawingml/2006/main" xmlns:r="http://schemas.openxmlformats.org/officeDocument/2006/relationships" xmlns:p="http://schemas.openxmlformats.org/presentationml/2006/main">
+  <p:cSld>
+    <p:spTree>
+      <p:nvGrpSpPr>
+        <p:cNvPr id="1" name=""/>
+        <p:cNvGrpSpPr/>
+        <p:nvPr/>
+      </p:nvGrpSpPr>
+      <p:grpSpPr>
+        <a:xfrm>
+          <a:off x="0" y="0"/>
+          <a:ext cx="0" cy="0"/>
+          <a:chOff x="0" y="0"/>
+          <a:chExt cx="0" cy="0"/>
+        </a:xfrm>
+      </p:grpSpPr>
+      <p:sp>
+        <p:nvSpPr>
+          <p:cNvPr id="2" name="Slide Image Placeholder 1"/>
+          <p:cNvSpPr>
+            <a:spLocks noGrp="1" noRot="1" noChangeAspect="1"/>
+          </p:cNvSpPr>
+          <p:nvPr>
+            <p:ph type="sldImg"/>
+          </p:nvPr>
+        </p:nvSpPr>
+        <p:spPr/>
+      </p:sp>
+      <p:sp>
+        <p:nvSpPr>
+          <p:cNvPr id="3" name="Notes Placeholder 2"/>
+          <p:cNvSpPr>
+            <a:spLocks noGrp="1"/>
+          </p:cNvSpPr>
+          <p:nvPr>
+            <p:ph type="body" idx="1"/>
+          </p:nvPr>
+        </p:nvSpPr>
+        <p:spPr/>
+        <p:txBody>
+          <a:bodyPr/>
+          <a:lstStyle/>
+          <a:p>
+            <a:pPr marL="171450" indent="-171450">
+              <a:buFontTx/>
+              <a:buChar char="-"/>
+            </a:pPr>
+            <a:r>
+              <a:rPr lang="en-US" b="0" dirty="0"/>
+              <a:t>Generate random image from the NASA API</a:t>
+            </a:r>
+          </a:p>
+          <a:p>
+            <a:pPr marL="171450" indent="-171450">
+              <a:buFontTx/>
+              <a:buChar char="-"/>
+            </a:pPr>
+            <a:r>
+              <a:rPr lang="en-US" b="0" dirty="0"/>
+              <a:t>Click to see detail view</a:t>
+            </a:r>
+          </a:p>
+          <a:p>
+            <a:pPr marL="171450" indent="-171450">
+              <a:buFontTx/>
+              <a:buChar char="-"/>
+            </a:pPr>
+            <a:r>
+              <a:rPr lang="en-US" b="0" dirty="0"/>
+              <a:t>different route from the astronomy images detail view, same component code being loaded -&gt; conditional routing button which looks at a snapshot of the </a:t>
+            </a:r>
+            <a:r>
+              <a:rPr lang="en-US" b="0" dirty="0" err="1"/>
+              <a:t>url</a:t>
+            </a:r>
+            <a:r>
+              <a:rPr lang="en-US" b="0" dirty="0"/>
+              <a:t> to differentiate whether it’s loaded a random-image detail view or a daily images detail view</a:t>
+            </a:r>
+          </a:p>
+          <a:p>
+            <a:pPr marL="171450" indent="-171450">
+              <a:buFontTx/>
+              <a:buChar char="-"/>
+            </a:pPr>
+            <a:r>
+              <a:rPr lang="en-US" b="1" dirty="0"/>
+              <a:t>Issues/Improvements</a:t>
+            </a:r>
+            <a:r>
+              <a:rPr lang="en-US" b="0" dirty="0"/>
+              <a:t>: Better handling of non-jpg responses from the </a:t>
+            </a:r>
+            <a:r>
+              <a:rPr lang="en-US" b="0" dirty="0" err="1"/>
+              <a:t>api</a:t>
+            </a:r>
+            <a:r>
+              <a:rPr lang="en-US" b="0" dirty="0"/>
+              <a:t>, better html elements and styling to deal with that.</a:t>
+            </a:r>
+          </a:p>
+          <a:p>
+            <a:pPr marL="171450" indent="-171450">
+              <a:buFontTx/>
+              <a:buChar char="-"/>
+            </a:pPr>
+            <a:endParaRPr lang="en-US" b="0" dirty="0"/>
+          </a:p>
+          <a:p>
+            <a:pPr marL="0" indent="0">
+              <a:buFontTx/>
+              <a:buNone/>
+            </a:pPr>
+            <a:r>
+              <a:rPr lang="en-US" b="1" dirty="0"/>
+              <a:t>IF THERE IS TIME: </a:t>
+            </a:r>
+            <a:r>
+              <a:rPr lang="en-US" b="0" dirty="0"/>
+              <a:t>Add the loader for when the images are not fully rendered</a:t>
+            </a:r>
+          </a:p>
+          <a:p>
+            <a:pPr marL="0" indent="0">
+              <a:buFontTx/>
+              <a:buNone/>
+            </a:pPr>
+            <a:endParaRPr lang="en-US" b="0" dirty="0"/>
+          </a:p>
+          <a:p>
+            <a:pPr marL="0" indent="0">
+              <a:buFontTx/>
+              <a:buNone/>
+            </a:pPr>
+            <a:r>
+              <a:rPr lang="en-US" b="1" dirty="0"/>
+              <a:t>Interesting Point</a:t>
+            </a:r>
+            <a:r>
+              <a:rPr lang="en-US" b="0" dirty="0"/>
+              <a:t> – Custom “skip” header assigned so that this request is not cached, which allows for a new image to be returned on each click</a:t>
+            </a:r>
+            <a:endParaRPr lang="en-US" b="1" dirty="0"/>
+          </a:p>
+        </p:txBody>
+      </p:sp>
+      <p:sp>
+        <p:nvSpPr>
+          <p:cNvPr id="4" name="Slide Number Placeholder 3"/>
+          <p:cNvSpPr>
+            <a:spLocks noGrp="1"/>
+          </p:cNvSpPr>
+          <p:nvPr>
+            <p:ph type="sldNum" sz="quarter" idx="5"/>
+          </p:nvPr>
+        </p:nvSpPr>
+        <p:spPr/>
+        <p:txBody>
+          <a:bodyPr/>
+          <a:lstStyle/>
+          <a:p>
+            <a:fld id="{AF533E96-F078-4B3D-A8F4-F1AF21EBC357}" type="slidenum">
+              <a:rPr lang="en-US" smtClean="0"/>
+              <a:t>4</a:t>
+            </a:fld>
+            <a:endParaRPr lang="en-US"/>
+          </a:p>
+        </p:txBody>
+      </p:sp>
+    </p:spTree>
+    <p:extLst>
+      <p:ext uri="{BB962C8B-B14F-4D97-AF65-F5344CB8AC3E}">
+        <p14:creationId xmlns:p14="http://schemas.microsoft.com/office/powerpoint/2010/main" val="1889210498"/>
+      </p:ext>
+    </p:extLst>
+  </p:cSld>
+  <p:clrMapOvr>
+    <a:masterClrMapping/>
+  </p:clrMapOvr>
+</p:notes>
+</file>
+
+<file path=ppt/notesSlides/notesSlide5.xml><?xml version="1.0" encoding="utf-8"?>
+<p:notes xmlns:a="http://schemas.openxmlformats.org/drawingml/2006/main" xmlns:r="http://schemas.openxmlformats.org/officeDocument/2006/relationships" xmlns:p="http://schemas.openxmlformats.org/presentationml/2006/main">
+  <p:cSld>
+    <p:spTree>
+      <p:nvGrpSpPr>
+        <p:cNvPr id="1" name=""/>
+        <p:cNvGrpSpPr/>
+        <p:nvPr/>
+      </p:nvGrpSpPr>
+      <p:grpSpPr>
+        <a:xfrm>
+          <a:off x="0" y="0"/>
+          <a:ext cx="0" cy="0"/>
+          <a:chOff x="0" y="0"/>
+          <a:chExt cx="0" cy="0"/>
+        </a:xfrm>
+      </p:grpSpPr>
+      <p:sp>
+        <p:nvSpPr>
+          <p:cNvPr id="2" name="Slide Image Placeholder 1"/>
+          <p:cNvSpPr>
+            <a:spLocks noGrp="1" noRot="1" noChangeAspect="1"/>
+          </p:cNvSpPr>
+          <p:nvPr>
+            <p:ph type="sldImg"/>
+          </p:nvPr>
+        </p:nvSpPr>
+        <p:spPr/>
+      </p:sp>
+      <p:sp>
+        <p:nvSpPr>
+          <p:cNvPr id="3" name="Notes Placeholder 2"/>
+          <p:cNvSpPr>
+            <a:spLocks noGrp="1"/>
+          </p:cNvSpPr>
+          <p:nvPr>
+            <p:ph type="body" idx="1"/>
+          </p:nvPr>
+        </p:nvSpPr>
+        <p:spPr/>
+        <p:txBody>
+          <a:bodyPr/>
+          <a:lstStyle/>
+          <a:p>
+            <a:pPr marL="0" indent="0">
+              <a:buFontTx/>
+              <a:buNone/>
+            </a:pPr>
+            <a:r>
+              <a:rPr lang="en-US" b="1" dirty="0"/>
+              <a:t>Talk about Pluralsight Specific stuff</a:t>
+            </a:r>
+          </a:p>
+          <a:p>
+            <a:pPr marL="0" indent="0">
+              <a:buFontTx/>
+              <a:buNone/>
+            </a:pPr>
+            <a:r>
+              <a:rPr lang="en-US" b="1" i="1" dirty="0"/>
+              <a:t>Note this should go to the front</a:t>
+            </a:r>
+            <a:endParaRPr lang="en-US" b="1" i="0" dirty="0"/>
+          </a:p>
+          <a:p>
+            <a:pPr marL="0" indent="0">
+              <a:buFontTx/>
+              <a:buNone/>
+            </a:pPr>
+            <a:endParaRPr lang="en-US" b="0" i="0" dirty="0"/>
+          </a:p>
+          <a:p>
+            <a:pPr marL="171450" indent="-171450">
+              <a:buFontTx/>
+              <a:buChar char="-"/>
+            </a:pPr>
+            <a:r>
+              <a:rPr lang="en-US" b="0" i="0" dirty="0"/>
+              <a:t>Angular Getting Started</a:t>
+            </a:r>
+          </a:p>
+          <a:p>
+            <a:pPr marL="628650" lvl="1" indent="-171450">
+              <a:buFontTx/>
+              <a:buChar char="-"/>
+            </a:pPr>
+            <a:r>
+              <a:rPr lang="en-US" b="0" i="0" dirty="0"/>
+              <a:t>Originally followed the architecture of one module per feature</a:t>
+            </a:r>
+          </a:p>
+          <a:p>
+            <a:pPr marL="628650" lvl="1" indent="-171450">
+              <a:buFontTx/>
+              <a:buChar char="-"/>
+            </a:pPr>
+            <a:r>
+              <a:rPr lang="en-US" b="0" i="0" dirty="0"/>
+              <a:t>Learned importance of the order of operations</a:t>
+            </a:r>
+          </a:p>
+          <a:p>
+            <a:pPr marL="628650" lvl="1" indent="-171450">
+              <a:buFontTx/>
+              <a:buChar char="-"/>
+            </a:pPr>
+            <a:r>
+              <a:rPr lang="en-US" b="0" i="0" dirty="0"/>
+              <a:t>Eventually condensed to one module</a:t>
+            </a:r>
+          </a:p>
+          <a:p>
+            <a:pPr marL="628650" lvl="1" indent="-171450">
+              <a:buFontTx/>
+              <a:buChar char="-"/>
+            </a:pPr>
+            <a:r>
+              <a:rPr lang="en-US" b="1" i="0" dirty="0"/>
+              <a:t>Potential Improvements</a:t>
+            </a:r>
+            <a:r>
+              <a:rPr lang="en-US" b="0" i="0" dirty="0"/>
+              <a:t>: Improve potential ease of scaling by segregating features into modules </a:t>
+            </a:r>
+            <a:r>
+              <a:rPr lang="en-US" b="0" i="1" dirty="0"/>
+              <a:t>properly</a:t>
+            </a:r>
+            <a:endParaRPr lang="en-US" b="0" i="0" dirty="0"/>
+          </a:p>
+          <a:p>
+            <a:pPr marL="171450" lvl="0" indent="-171450">
+              <a:buFontTx/>
+              <a:buChar char="-"/>
+            </a:pPr>
+            <a:r>
+              <a:rPr lang="en-US" b="0" i="0" dirty="0"/>
+              <a:t>Angular CLI</a:t>
+            </a:r>
+          </a:p>
+          <a:p>
+            <a:pPr marL="628650" lvl="1" indent="-171450">
+              <a:buFontTx/>
+              <a:buChar char="-"/>
+            </a:pPr>
+            <a:r>
+              <a:rPr lang="en-US" b="0" i="0" dirty="0"/>
+              <a:t>Use this for nearly every new Angular item generated</a:t>
+            </a:r>
+          </a:p>
+          <a:p>
+            <a:pPr marL="171450" lvl="0" indent="-171450">
+              <a:buFontTx/>
+              <a:buChar char="-"/>
+            </a:pPr>
+            <a:r>
+              <a:rPr lang="en-US" b="0" i="0" dirty="0"/>
+              <a:t>Angular Routing</a:t>
+            </a:r>
+          </a:p>
+          <a:p>
+            <a:pPr marL="628650" lvl="1" indent="-171450">
+              <a:buFontTx/>
+              <a:buChar char="-"/>
+            </a:pPr>
+            <a:r>
+              <a:rPr lang="en-US" b="0" i="0" dirty="0"/>
+              <a:t>Lazy loading -&gt; I implemented this early on, ended up removing this to simplify the app</a:t>
+            </a:r>
+          </a:p>
+          <a:p>
+            <a:pPr marL="628650" lvl="1" indent="-171450">
+              <a:buFontTx/>
+              <a:buChar char="-"/>
+            </a:pPr>
+            <a:r>
+              <a:rPr lang="en-US" b="1" i="0" dirty="0"/>
+              <a:t>Potential Improvement</a:t>
+            </a:r>
+            <a:r>
+              <a:rPr lang="en-US" b="0" i="0" dirty="0"/>
+              <a:t> would be to use lazy loading for the two feature views</a:t>
+            </a:r>
+          </a:p>
+          <a:p>
+            <a:pPr marL="171450" lvl="0" indent="-171450">
+              <a:buFontTx/>
+              <a:buChar char="-"/>
+            </a:pPr>
+            <a:r>
+              <a:rPr lang="en-US" b="0" i="0" dirty="0"/>
+              <a:t>Angular Services</a:t>
+            </a:r>
+          </a:p>
+          <a:p>
+            <a:pPr marL="628650" lvl="1" indent="-171450">
+              <a:buFontTx/>
+              <a:buChar char="-"/>
+            </a:pPr>
+            <a:r>
+              <a:rPr lang="en-US" b="0" i="0" dirty="0"/>
+              <a:t>Dependency Injection</a:t>
+            </a:r>
+          </a:p>
+          <a:p>
+            <a:pPr marL="628650" lvl="1" indent="-171450">
+              <a:buFontTx/>
+              <a:buChar char="-"/>
+            </a:pPr>
+            <a:r>
+              <a:rPr lang="en-US" b="0" i="0" dirty="0"/>
+              <a:t>Observables</a:t>
+            </a:r>
+            <a:endParaRPr lang="en-US" b="1" i="0" dirty="0"/>
+          </a:p>
+          <a:p>
+            <a:pPr marL="171450" indent="-171450">
+              <a:buFontTx/>
+              <a:buChar char="-"/>
+            </a:pPr>
+            <a:r>
+              <a:rPr lang="en-US" b="0" i="0" dirty="0"/>
+              <a:t>Styling Angular Applications</a:t>
+            </a:r>
+          </a:p>
+          <a:p>
+            <a:pPr marL="628650" lvl="1" indent="-171450">
+              <a:buFontTx/>
+              <a:buChar char="-"/>
+            </a:pPr>
+            <a:r>
+              <a:rPr lang="en-US" b="0" i="0" dirty="0"/>
+              <a:t>BEM class names -&gt; </a:t>
+            </a:r>
+            <a:r>
+              <a:rPr lang="en-US" b="1" i="0" dirty="0"/>
+              <a:t>Block Element Modifiers</a:t>
+            </a:r>
+            <a:endParaRPr lang="en-US" b="0" i="0" dirty="0"/>
+          </a:p>
+          <a:p>
+            <a:pPr marL="628650" lvl="1" indent="-171450">
+              <a:buFontTx/>
+              <a:buChar char="-"/>
+            </a:pPr>
+            <a:r>
+              <a:rPr lang="en-US" b="0" i="0" dirty="0"/>
+              <a:t>SCSS Architecture and methods</a:t>
+            </a:r>
+          </a:p>
+          <a:p>
+            <a:pPr marL="171450" lvl="0" indent="-171450">
+              <a:buFontTx/>
+              <a:buChar char="-"/>
+            </a:pPr>
+            <a:r>
+              <a:rPr lang="en-US" b="0" i="0" dirty="0"/>
+              <a:t>Styling Applications with Angular Material</a:t>
+            </a:r>
+          </a:p>
+          <a:p>
+            <a:pPr marL="628650" lvl="1" indent="-171450">
+              <a:buFontTx/>
+              <a:buChar char="-"/>
+            </a:pPr>
+            <a:r>
+              <a:rPr lang="en-US" b="0" i="0" dirty="0"/>
+              <a:t>Sidenav, toolbar, buttons, theme</a:t>
+            </a:r>
+          </a:p>
+          <a:p>
+            <a:pPr marL="171450" lvl="0" indent="-171450">
+              <a:buFontTx/>
+              <a:buChar char="-"/>
+            </a:pPr>
+            <a:r>
+              <a:rPr lang="en-US" b="0" i="0" dirty="0"/>
+              <a:t>Unit Testing in Angular</a:t>
+            </a:r>
+          </a:p>
+          <a:p>
+            <a:pPr marL="628650" lvl="1" indent="-171450">
+              <a:buFontTx/>
+              <a:buChar char="-"/>
+            </a:pPr>
+            <a:r>
+              <a:rPr lang="en-US" b="0" i="0" dirty="0"/>
+              <a:t>All unit tests from here</a:t>
+            </a:r>
+          </a:p>
+          <a:p>
+            <a:pPr marL="628650" lvl="1" indent="-171450">
+              <a:buFontTx/>
+              <a:buChar char="-"/>
+            </a:pPr>
+            <a:r>
+              <a:rPr lang="en-US" b="1" i="0" dirty="0"/>
+              <a:t>Improvement</a:t>
+            </a:r>
+            <a:r>
+              <a:rPr lang="en-US" b="0" i="0" dirty="0"/>
+              <a:t>: Study Jasmine/Karma -&gt; need to improve integration testing, unit testing directives, using </a:t>
+            </a:r>
+            <a:r>
+              <a:rPr lang="en-US" b="1" i="0" dirty="0"/>
+              <a:t>spy()</a:t>
+            </a:r>
+            <a:r>
+              <a:rPr lang="en-US" b="0" i="0" dirty="0"/>
+              <a:t>, testing Components with their template, directives, testing classes with dependencies more</a:t>
+            </a:r>
+            <a:endParaRPr lang="en-US" b="1" i="0" dirty="0"/>
+          </a:p>
+          <a:p>
+            <a:pPr marL="171450" lvl="0" indent="-171450">
+              <a:buFontTx/>
+              <a:buChar char="-"/>
+            </a:pPr>
+            <a:r>
+              <a:rPr lang="en-US" b="0" i="0" dirty="0"/>
+              <a:t>Angular Fundamentals</a:t>
+            </a:r>
+          </a:p>
+          <a:p>
+            <a:pPr marL="628650" lvl="1" indent="-171450">
+              <a:buFontTx/>
+              <a:buChar char="-"/>
+            </a:pPr>
+            <a:r>
+              <a:rPr lang="en-US" b="0" i="0" dirty="0"/>
+              <a:t>Meteorites-list originated from this course as the first iteration of the project</a:t>
+            </a:r>
+          </a:p>
+          <a:p>
+            <a:pPr marL="628650" lvl="1" indent="-171450">
+              <a:buFontTx/>
+              <a:buChar char="-"/>
+            </a:pPr>
+            <a:r>
+              <a:rPr lang="en-US" b="0" i="0" dirty="0"/>
+              <a:t>First attempt was just the list, and getting this to work with parent-child components</a:t>
+            </a:r>
+          </a:p>
+          <a:p>
+            <a:pPr marL="628650" lvl="1" indent="-171450">
+              <a:buFontTx/>
+              <a:buChar char="-"/>
+            </a:pPr>
+            <a:r>
+              <a:rPr lang="en-US" b="0" i="0" dirty="0"/>
+              <a:t>Route Resolvers</a:t>
+            </a:r>
+          </a:p>
+          <a:p>
+            <a:pPr marL="171450" lvl="0" indent="-171450">
+              <a:buFontTx/>
+              <a:buChar char="-"/>
+            </a:pPr>
+            <a:r>
+              <a:rPr lang="en-US" b="0" i="0" dirty="0"/>
+              <a:t>Angular HTTP Communication</a:t>
+            </a:r>
+          </a:p>
+          <a:p>
+            <a:pPr marL="628650" lvl="1" indent="-171450">
+              <a:buFontTx/>
+              <a:buChar char="-"/>
+            </a:pPr>
+            <a:r>
+              <a:rPr lang="en-US" b="0" i="0" dirty="0"/>
+              <a:t>Structuring API Requests</a:t>
+            </a:r>
+          </a:p>
+          <a:p>
+            <a:pPr marL="628650" lvl="1" indent="-171450">
+              <a:buFontTx/>
+              <a:buChar char="-"/>
+            </a:pPr>
+            <a:r>
+              <a:rPr lang="en-US" b="0" i="0" dirty="0"/>
+              <a:t>Caching Interceptor / Simple caching strategy</a:t>
+            </a:r>
+          </a:p>
+          <a:p>
+            <a:pPr marL="628650" lvl="1" indent="-171450">
+              <a:buFontTx/>
+              <a:buChar char="-"/>
+            </a:pPr>
+            <a:r>
+              <a:rPr lang="en-US" b="0" i="0" dirty="0"/>
+              <a:t>Unit testing HTTP requests</a:t>
+            </a:r>
+          </a:p>
+          <a:p>
+            <a:pPr marL="171450" lvl="0" indent="-171450">
+              <a:buFontTx/>
+              <a:buChar char="-"/>
+            </a:pPr>
+            <a:r>
+              <a:rPr lang="en-US" b="0" i="0" dirty="0" err="1"/>
+              <a:t>RxJS</a:t>
+            </a:r>
+            <a:r>
+              <a:rPr lang="en-US" b="0" i="0" dirty="0"/>
+              <a:t> in Angular: Reactive Development</a:t>
+            </a:r>
+          </a:p>
+          <a:p>
+            <a:pPr marL="628650" lvl="1" indent="-171450">
+              <a:buFontTx/>
+              <a:buChar char="-"/>
+            </a:pPr>
+            <a:r>
+              <a:rPr lang="en-US" b="0" i="0" dirty="0"/>
+              <a:t>Subscriptions</a:t>
+            </a:r>
+          </a:p>
+          <a:p>
+            <a:pPr marL="628650" lvl="1" indent="-171450">
+              <a:buFontTx/>
+              <a:buChar char="-"/>
+            </a:pPr>
+            <a:r>
+              <a:rPr lang="en-US" b="0" i="0" dirty="0" err="1"/>
+              <a:t>rxjs</a:t>
+            </a:r>
+            <a:r>
+              <a:rPr lang="en-US" b="0" i="0" dirty="0"/>
+              <a:t> operators -&gt; pipe, take, map</a:t>
+            </a:r>
+          </a:p>
+          <a:p>
+            <a:pPr marL="628650" lvl="1" indent="-171450">
+              <a:buFontTx/>
+              <a:buChar char="-"/>
+            </a:pPr>
+            <a:r>
+              <a:rPr lang="en-US" b="0" i="1" dirty="0"/>
+              <a:t>Got from shadowing, shout out Anthony Travisano </a:t>
+            </a:r>
+            <a:r>
+              <a:rPr lang="en-US" b="0" i="0" dirty="0"/>
+              <a:t>-&gt; take(1)</a:t>
+            </a:r>
+          </a:p>
+          <a:p>
+            <a:pPr marL="628650" lvl="1" indent="-171450">
+              <a:buFontTx/>
+              <a:buChar char="-"/>
+            </a:pPr>
+            <a:r>
+              <a:rPr lang="en-US" b="0" i="0" dirty="0" err="1"/>
+              <a:t>distinctUntilChanged</a:t>
+            </a:r>
+            <a:r>
+              <a:rPr lang="en-US" b="0" i="0" dirty="0"/>
+              <a:t>()</a:t>
+            </a:r>
+          </a:p>
+          <a:p>
+            <a:pPr marL="628650" lvl="1" indent="-171450">
+              <a:buFontTx/>
+              <a:buChar char="-"/>
+            </a:pPr>
+            <a:r>
+              <a:rPr lang="en-US" b="1" i="0" dirty="0"/>
+              <a:t>Places of Improvement</a:t>
+            </a:r>
+            <a:r>
+              <a:rPr lang="en-US" b="0" i="0" dirty="0"/>
+              <a:t>: </a:t>
+            </a:r>
+            <a:r>
+              <a:rPr lang="en-US" b="0" i="1" dirty="0"/>
+              <a:t>Combining Data Streams,</a:t>
+            </a:r>
+            <a:r>
+              <a:rPr lang="en-US" b="0" i="0" dirty="0"/>
+              <a:t> generally more practice with this, manipulating incoming data in the subscription or request</a:t>
+            </a:r>
+            <a:endParaRPr lang="en-US" b="1" i="1" dirty="0"/>
+          </a:p>
+          <a:p>
+            <a:pPr marL="171450" lvl="0" indent="-171450">
+              <a:buFontTx/>
+              <a:buChar char="-"/>
+            </a:pPr>
+            <a:r>
+              <a:rPr lang="en-US" b="0" i="0" dirty="0"/>
+              <a:t>Angular Architecture and Best Practices</a:t>
+            </a:r>
+          </a:p>
+          <a:p>
+            <a:pPr marL="628650" lvl="1" indent="-171450">
+              <a:buFontTx/>
+              <a:buChar char="-"/>
+            </a:pPr>
+            <a:r>
+              <a:rPr lang="en-US" b="0" i="0" dirty="0"/>
+              <a:t>Container-Presentation Pattern</a:t>
+            </a:r>
+          </a:p>
+          <a:p>
+            <a:pPr marL="1085850" lvl="2" indent="-171450">
+              <a:buFontTx/>
+              <a:buChar char="-"/>
+            </a:pPr>
+            <a:r>
+              <a:rPr lang="en-US" b="0" i="0" dirty="0"/>
+              <a:t>Container component manages all state</a:t>
+            </a:r>
+          </a:p>
+          <a:p>
+            <a:pPr marL="1085850" lvl="2" indent="-171450">
+              <a:buFontTx/>
+              <a:buChar char="-"/>
+            </a:pPr>
+            <a:r>
+              <a:rPr lang="en-US" b="0" i="0" dirty="0"/>
+              <a:t>Change Detection Strategy</a:t>
+            </a:r>
+          </a:p>
+          <a:p>
+            <a:pPr marL="1085850" lvl="2" indent="-171450">
+              <a:buFontTx/>
+              <a:buChar char="-"/>
+            </a:pPr>
+            <a:r>
+              <a:rPr lang="en-US" b="1" i="0" dirty="0"/>
+              <a:t>Future Improvement</a:t>
+            </a:r>
+            <a:r>
+              <a:rPr lang="en-US" b="0" i="0" dirty="0"/>
+              <a:t>: Add </a:t>
+            </a:r>
+            <a:r>
+              <a:rPr lang="en-US" b="0" i="0" dirty="0" err="1"/>
+              <a:t>OnPush</a:t>
+            </a:r>
+            <a:r>
+              <a:rPr lang="en-US" b="0" i="0" dirty="0"/>
+              <a:t> to children</a:t>
+            </a:r>
+          </a:p>
+          <a:p>
+            <a:pPr marL="628650" lvl="1" indent="-171450">
+              <a:buFontTx/>
+              <a:buChar char="-"/>
+            </a:pPr>
+            <a:r>
+              <a:rPr lang="en-US" b="0" i="0" dirty="0" err="1"/>
+              <a:t>rxjs</a:t>
+            </a:r>
+            <a:r>
+              <a:rPr lang="en-US" b="0" i="0" dirty="0"/>
+              <a:t> Subjects, </a:t>
+            </a:r>
+            <a:r>
+              <a:rPr lang="en-US" b="0" i="0" dirty="0" err="1"/>
+              <a:t>ReplaySubjects</a:t>
+            </a:r>
+            <a:endParaRPr lang="en-US" b="1" i="0" dirty="0"/>
+          </a:p>
+          <a:p>
+            <a:pPr marL="628650" lvl="1" indent="-171450">
+              <a:buFontTx/>
+              <a:buChar char="-"/>
+            </a:pPr>
+            <a:r>
+              <a:rPr lang="en-US" b="0" i="0" dirty="0"/>
+              <a:t>Custom Library -&gt; in progress</a:t>
+            </a:r>
+          </a:p>
+          <a:p>
+            <a:pPr marL="628650" lvl="1" indent="-171450">
+              <a:buFontTx/>
+              <a:buChar char="-"/>
+            </a:pPr>
+            <a:r>
+              <a:rPr lang="en-US" b="0" i="0" dirty="0"/>
+              <a:t>Immutability</a:t>
+            </a:r>
+          </a:p>
+          <a:p>
+            <a:pPr marL="628650" lvl="1" indent="-171450">
+              <a:buFontTx/>
+              <a:buChar char="-"/>
+            </a:pPr>
+            <a:r>
+              <a:rPr lang="en-US" b="0" i="0" dirty="0"/>
+              <a:t>Inspiration from the </a:t>
+            </a:r>
+            <a:r>
+              <a:rPr lang="en-US" b="0" i="0" dirty="0" err="1"/>
+              <a:t>EventBus</a:t>
+            </a:r>
+            <a:r>
+              <a:rPr lang="en-US" b="0" i="0" dirty="0"/>
+              <a:t> service</a:t>
+            </a:r>
+          </a:p>
+          <a:p>
+            <a:pPr marL="628650" lvl="1" indent="-171450">
+              <a:buFontTx/>
+              <a:buChar char="-"/>
+            </a:pPr>
+            <a:r>
+              <a:rPr lang="en-US" b="0" i="0" dirty="0"/>
+              <a:t>Inspiration for managing state (Loader Service)</a:t>
+            </a:r>
+          </a:p>
+          <a:p>
+            <a:pPr marL="171450" lvl="0" indent="-171450">
+              <a:buFontTx/>
+              <a:buChar char="-"/>
+            </a:pPr>
+            <a:r>
+              <a:rPr lang="en-US" b="0" i="0" dirty="0"/>
+              <a:t>SOLID Principle of Object Oriented Design</a:t>
+            </a:r>
+          </a:p>
+          <a:p>
+            <a:pPr marL="628650" lvl="1" indent="-171450">
+              <a:buFontTx/>
+              <a:buChar char="-"/>
+            </a:pPr>
+            <a:r>
+              <a:rPr lang="en-US" b="0" i="0" dirty="0"/>
+              <a:t>Single Use Principle</a:t>
+            </a:r>
+          </a:p>
+          <a:p>
+            <a:pPr marL="628650" lvl="1" indent="-171450">
+              <a:buFontTx/>
+              <a:buChar char="-"/>
+            </a:pPr>
+            <a:r>
+              <a:rPr lang="en-US" b="0" i="0" dirty="0"/>
+              <a:t>Open/Closed Principle</a:t>
+            </a:r>
+          </a:p>
+          <a:p>
+            <a:pPr marL="1085850" lvl="2" indent="-171450">
+              <a:buFontTx/>
+              <a:buChar char="-"/>
+            </a:pPr>
+            <a:r>
+              <a:rPr lang="en-US" b="0" i="0" dirty="0"/>
+              <a:t>Attempt at refactoring sorting/filtering to open up more use cases</a:t>
+            </a:r>
+          </a:p>
+          <a:p>
+            <a:pPr marL="628650" lvl="1" indent="-171450">
+              <a:buFontTx/>
+              <a:buChar char="-"/>
+            </a:pPr>
+            <a:r>
+              <a:rPr lang="en-US" b="0" i="0" dirty="0"/>
+              <a:t>Don’t Repeat Yourself</a:t>
+            </a:r>
+          </a:p>
+          <a:p>
+            <a:pPr marL="1085850" lvl="2" indent="-171450">
+              <a:buFontTx/>
+              <a:buChar char="-"/>
+            </a:pPr>
+            <a:r>
+              <a:rPr lang="en-US" b="0" i="0" dirty="0"/>
+              <a:t>Refactored individual request service methods to  a singular </a:t>
+            </a:r>
+            <a:r>
+              <a:rPr lang="en-US" b="0" i="0" dirty="0" err="1"/>
+              <a:t>DataService</a:t>
+            </a:r>
+            <a:endParaRPr lang="en-US" b="0" i="0" dirty="0"/>
+          </a:p>
+          <a:p>
+            <a:pPr marL="628650" lvl="1" indent="-171450">
+              <a:buFontTx/>
+              <a:buChar char="-"/>
+            </a:pPr>
+            <a:r>
+              <a:rPr lang="en-US" b="0" i="0" dirty="0"/>
+              <a:t>Dependency Inversion Principle</a:t>
+            </a:r>
+          </a:p>
+          <a:p>
+            <a:pPr marL="1085850" lvl="2" indent="-171450">
+              <a:buFontTx/>
+              <a:buChar char="-"/>
+            </a:pPr>
+            <a:r>
+              <a:rPr lang="en-US" b="0" i="0" dirty="0"/>
+              <a:t>Creating “honest” code that “tells you its dependencies” in the constructor </a:t>
+            </a:r>
+            <a:r>
+              <a:rPr lang="en-US" b="0" i="1" dirty="0"/>
+              <a:t>might not be the right principle, but definitely from this course</a:t>
+            </a:r>
+            <a:endParaRPr lang="en-US" b="0" i="0" dirty="0"/>
+          </a:p>
+        </p:txBody>
+      </p:sp>
+      <p:sp>
+        <p:nvSpPr>
+          <p:cNvPr id="4" name="Slide Number Placeholder 3"/>
+          <p:cNvSpPr>
+            <a:spLocks noGrp="1"/>
+          </p:cNvSpPr>
+          <p:nvPr>
+            <p:ph type="sldNum" sz="quarter" idx="5"/>
+          </p:nvPr>
+        </p:nvSpPr>
+        <p:spPr/>
+        <p:txBody>
+          <a:bodyPr/>
+          <a:lstStyle/>
+          <a:p>
+            <a:fld id="{AF533E96-F078-4B3D-A8F4-F1AF21EBC357}" type="slidenum">
               <a:rPr lang="en-US" smtClean="0"/>
               <a:t>5</a:t>
             </a:fld>
@@ -553,7 +2176,7 @@
     </p:spTree>
     <p:extLst>
       <p:ext uri="{BB962C8B-B14F-4D97-AF65-F5344CB8AC3E}">
-        <p14:creationId xmlns:p14="http://schemas.microsoft.com/office/powerpoint/2010/main" val="1284596819"/>
+        <p14:creationId xmlns:p14="http://schemas.microsoft.com/office/powerpoint/2010/main" val="2584351615"/>
       </p:ext>
     </p:extLst>
   </p:cSld>
@@ -4105,21 +5728,28 @@
           <a:p>
             <a:r>
               <a:rPr lang="en-US" dirty="0"/>
-              <a:t>Click to edit </a:t>
+              <a:t>NEO</a:t>
             </a:r>
             <a:br>
               <a:rPr lang="en-US" dirty="0"/>
             </a:br>
             <a:r>
-              <a:rPr lang="en-US" dirty="0"/>
-              <a:t>Master title style</a:t>
-            </a:r>
-          </a:p>
-        </p:txBody>
-      </p:sp>
-      <p:sp>
-        <p:nvSpPr>
-          <p:cNvPr id="3" name="Subtitle 2"/>
+              <a:rPr lang="en-US" sz="1200" dirty="0"/>
+              <a:t>(Near Earth Objects)</a:t>
+            </a:r>
+            <a:endParaRPr lang="en-US" dirty="0"/>
+          </a:p>
+        </p:txBody>
+      </p:sp>
+      <p:sp>
+        <p:nvSpPr>
+          <p:cNvPr id="5" name="Subtitle 4">
+            <a:extLst>
+              <a:ext uri="{FF2B5EF4-FFF2-40B4-BE49-F238E27FC236}">
+                <a16:creationId xmlns:a16="http://schemas.microsoft.com/office/drawing/2014/main" id="{8AFCE80C-7DA6-4E33-A8F4-3CD6C420C146}"/>
+              </a:ext>
+            </a:extLst>
+          </p:cNvPr>
           <p:cNvSpPr>
             <a:spLocks noGrp="1"/>
           </p:cNvSpPr>
@@ -4129,18 +5759,59 @@
         </p:nvSpPr>
         <p:spPr>
           <a:xfrm>
-            <a:off x="560440" y="3923072"/>
-            <a:ext cx="6828502" cy="730043"/>
+            <a:off x="545690" y="3630706"/>
+            <a:ext cx="6939116" cy="685950"/>
           </a:xfrm>
         </p:spPr>
         <p:txBody>
-          <a:bodyPr/>
+          <a:bodyPr>
+            <a:normAutofit/>
+          </a:bodyPr>
           <a:lstStyle/>
           <a:p>
             <a:r>
-              <a:rPr lang="en-US" dirty="0"/>
-              <a:t>FPPT.com</a:t>
-            </a:r>
+              <a:rPr lang="en-US" sz="2400" dirty="0">
+                <a:ln>
+                  <a:solidFill>
+                    <a:schemeClr val="accent4">
+                      <a:lumMod val="50000"/>
+                    </a:schemeClr>
+                  </a:solidFill>
+                </a:ln>
+                <a:solidFill>
+                  <a:schemeClr val="accent4"/>
+                </a:solidFill>
+                <a:effectLst>
+                  <a:outerShdw blurRad="50800" dist="38100" dir="2700000" algn="tl" rotWithShape="0">
+                    <a:prstClr val="black">
+                      <a:alpha val="40000"/>
+                    </a:prstClr>
+                  </a:outerShdw>
+                </a:effectLst>
+                <a:ea typeface="+mj-ea"/>
+                <a:cs typeface="+mj-cs"/>
+              </a:rPr>
+              <a:t>An Angular Demonstration</a:t>
+            </a:r>
+            <a:endParaRPr lang="en-US" sz="1800" dirty="0">
+              <a:ln>
+                <a:solidFill>
+                  <a:schemeClr val="accent4">
+                    <a:lumMod val="50000"/>
+                  </a:schemeClr>
+                </a:solidFill>
+              </a:ln>
+              <a:solidFill>
+                <a:schemeClr val="accent4"/>
+              </a:solidFill>
+              <a:effectLst>
+                <a:outerShdw blurRad="50800" dist="38100" dir="2700000" algn="tl" rotWithShape="0">
+                  <a:prstClr val="black">
+                    <a:alpha val="40000"/>
+                  </a:prstClr>
+                </a:outerShdw>
+              </a:effectLst>
+            </a:endParaRPr>
           </a:p>
         </p:txBody>
       </p:sp>
@@ -4193,7 +5864,7 @@
           <a:p>
             <a:r>
               <a:rPr lang="en-US" dirty="0"/>
-              <a:t>Slide Title</a:t>
+              <a:t>Home View</a:t>
             </a:r>
           </a:p>
         </p:txBody>
@@ -4215,32 +5886,14 @@
           <a:p>
             <a:r>
               <a:rPr lang="en-US" dirty="0"/>
-              <a:t>Make Effective Presentations</a:t>
+              <a:t>Material Design components and color</a:t>
             </a:r>
           </a:p>
           <a:p>
             <a:r>
               <a:rPr lang="en-US" dirty="0"/>
-              <a:t>Using Awesome Backgrounds</a:t>
-            </a:r>
-          </a:p>
-          <a:p>
-            <a:r>
-              <a:rPr lang="en-US" dirty="0"/>
-              <a:t>Engage your Audience</a:t>
-            </a:r>
-          </a:p>
-          <a:p>
-            <a:r>
-              <a:rPr lang="en-US" dirty="0"/>
-              <a:t>Capture Audience Attention</a:t>
-            </a:r>
-          </a:p>
-          <a:p>
-            <a:endParaRPr lang="en-US" dirty="0"/>
-          </a:p>
-          <a:p>
-            <a:endParaRPr lang="en-US" dirty="0"/>
+              <a:t>Sorting and Filtering</a:t>
+            </a:r>
           </a:p>
         </p:txBody>
       </p:sp>
@@ -4292,10 +5945,9 @@
           <a:lstStyle/>
           <a:p>
             <a:r>
-              <a:rPr lang="en-US"/>
-              <a:t>Slide Title</a:t>
-            </a:r>
-            <a:endParaRPr lang="en-US" dirty="0"/>
+              <a:rPr lang="en-US" dirty="0"/>
+              <a:t>Astronomy Images</a:t>
+            </a:r>
           </a:p>
         </p:txBody>
       </p:sp>
@@ -4315,28 +5967,21 @@
           <a:lstStyle/>
           <a:p>
             <a:r>
-              <a:rPr lang="en-US"/>
-              <a:t>Make Effective Presentations</a:t>
-            </a:r>
-          </a:p>
-          <a:p>
-            <a:r>
-              <a:rPr lang="en-US"/>
-              <a:t>Using Awesome Backgrounds</a:t>
-            </a:r>
-          </a:p>
-          <a:p>
-            <a:r>
-              <a:rPr lang="en-US"/>
-              <a:t>Engage your Audience</a:t>
-            </a:r>
-          </a:p>
-          <a:p>
-            <a:r>
-              <a:rPr lang="en-US"/>
-              <a:t>Capture Audience Attention</a:t>
-            </a:r>
-            <a:endParaRPr lang="en-US" dirty="0"/>
+              <a:rPr lang="en-US" dirty="0"/>
+              <a:t>Responsive grid</a:t>
+            </a:r>
+          </a:p>
+          <a:p>
+            <a:r>
+              <a:rPr lang="en-US" dirty="0"/>
+              <a:t>Detail view</a:t>
+            </a:r>
+          </a:p>
+          <a:p>
+            <a:r>
+              <a:rPr lang="en-US" dirty="0"/>
+              <a:t>Date-based API request</a:t>
+            </a:r>
           </a:p>
         </p:txBody>
       </p:sp>
@@ -4389,19 +6034,19 @@
           <a:p>
             <a:r>
               <a:rPr lang="en-US" dirty="0"/>
-              <a:t>Slide Title</a:t>
-            </a:r>
-          </a:p>
-        </p:txBody>
-      </p:sp>
-      <p:sp>
-        <p:nvSpPr>
-          <p:cNvPr id="5" name="Text Placeholder 4"/>
-          <p:cNvSpPr>
-            <a:spLocks noGrp="1"/>
-          </p:cNvSpPr>
-          <p:nvPr>
-            <p:ph type="body" idx="1"/>
+              <a:t>Random Image</a:t>
+            </a:r>
+          </a:p>
+        </p:txBody>
+      </p:sp>
+      <p:sp>
+        <p:nvSpPr>
+          <p:cNvPr id="5" name="Content Placeholder 4"/>
+          <p:cNvSpPr>
+            <a:spLocks noGrp="1"/>
+          </p:cNvSpPr>
+          <p:nvPr>
+            <p:ph idx="1"/>
           </p:nvPr>
         </p:nvSpPr>
         <p:spPr/>
@@ -4410,108 +6055,25 @@
           <a:lstStyle/>
           <a:p>
             <a:r>
-              <a:rPr lang="en-US"/>
-              <a:t>Product A</a:t>
-            </a:r>
+              <a:rPr lang="en-US" dirty="0"/>
+              <a:t>Conditional Routing to originating view</a:t>
+            </a:r>
+          </a:p>
+          <a:p>
+            <a:r>
+              <a:rPr lang="en-US" dirty="0"/>
+              <a:t>Custom Headers</a:t>
+            </a:r>
+          </a:p>
+          <a:p>
             <a:endParaRPr lang="en-US" dirty="0"/>
-          </a:p>
-        </p:txBody>
-      </p:sp>
-      <p:sp>
-        <p:nvSpPr>
-          <p:cNvPr id="6" name="Content Placeholder 5"/>
-          <p:cNvSpPr>
-            <a:spLocks noGrp="1"/>
-          </p:cNvSpPr>
-          <p:nvPr>
-            <p:ph sz="half" idx="2"/>
-          </p:nvPr>
-        </p:nvSpPr>
-        <p:spPr/>
-        <p:txBody>
-          <a:bodyPr/>
-          <a:lstStyle/>
-          <a:p>
-            <a:r>
-              <a:rPr lang="en-US"/>
-              <a:t>Feature 1</a:t>
-            </a:r>
-          </a:p>
-          <a:p>
-            <a:r>
-              <a:rPr lang="en-US"/>
-              <a:t>Feature 2</a:t>
-            </a:r>
-          </a:p>
-          <a:p>
-            <a:r>
-              <a:rPr lang="en-US"/>
-              <a:t>Feature 3</a:t>
-            </a:r>
-            <a:endParaRPr lang="en-US" dirty="0"/>
-          </a:p>
-        </p:txBody>
-      </p:sp>
-      <p:sp>
-        <p:nvSpPr>
-          <p:cNvPr id="7" name="Text Placeholder 6"/>
-          <p:cNvSpPr>
-            <a:spLocks noGrp="1"/>
-          </p:cNvSpPr>
-          <p:nvPr>
-            <p:ph type="body" sz="quarter" idx="3"/>
-          </p:nvPr>
-        </p:nvSpPr>
-        <p:spPr/>
-        <p:txBody>
-          <a:bodyPr/>
-          <a:lstStyle/>
-          <a:p>
-            <a:r>
-              <a:rPr lang="en-US"/>
-              <a:t>Product B</a:t>
-            </a:r>
-          </a:p>
-        </p:txBody>
-      </p:sp>
-      <p:sp>
-        <p:nvSpPr>
-          <p:cNvPr id="8" name="Content Placeholder 7"/>
-          <p:cNvSpPr>
-            <a:spLocks noGrp="1"/>
-          </p:cNvSpPr>
-          <p:nvPr>
-            <p:ph sz="quarter" idx="4"/>
-          </p:nvPr>
-        </p:nvSpPr>
-        <p:spPr/>
-        <p:txBody>
-          <a:bodyPr/>
-          <a:lstStyle/>
-          <a:p>
-            <a:r>
-              <a:rPr lang="en-US"/>
-              <a:t>Feature 1</a:t>
-            </a:r>
-          </a:p>
-          <a:p>
-            <a:r>
-              <a:rPr lang="en-US"/>
-              <a:t>Feature 2</a:t>
-            </a:r>
-          </a:p>
-          <a:p>
-            <a:r>
-              <a:rPr lang="en-US"/>
-              <a:t>Feature 3</a:t>
-            </a:r>
           </a:p>
         </p:txBody>
       </p:sp>
     </p:spTree>
     <p:extLst>
       <p:ext uri="{BB962C8B-B14F-4D97-AF65-F5344CB8AC3E}">
-        <p14:creationId xmlns:p14="http://schemas.microsoft.com/office/powerpoint/2010/main" val="4170783713"/>
+        <p14:creationId xmlns:p14="http://schemas.microsoft.com/office/powerpoint/2010/main" val="470978544"/>
       </p:ext>
     </p:extLst>
   </p:cSld>
@@ -4538,53 +6100,87 @@
           <a:chExt cx="0" cy="0"/>
         </a:xfrm>
       </p:grpSpPr>
-      <p:pic>
-        <p:nvPicPr>
-          <p:cNvPr id="3" name="Picture 2" descr="E:\websites\free-power-point-templates\2012\logos.png"/>
-          <p:cNvPicPr>
-            <a:picLocks noChangeAspect="1" noChangeArrowheads="1"/>
-          </p:cNvPicPr>
-          <p:nvPr/>
-        </p:nvPicPr>
-        <p:blipFill>
-          <a:blip r:embed="rId3">
-            <a:extLst>
-              <a:ext uri="{28A0092B-C50C-407E-A947-70E740481C1C}">
-                <a14:useLocalDpi xmlns:a14="http://schemas.microsoft.com/office/drawing/2010/main" val="0"/>
-              </a:ext>
-            </a:extLst>
-          </a:blip>
-          <a:stretch>
-            <a:fillRect/>
-          </a:stretch>
-        </p:blipFill>
-        <p:spPr bwMode="auto">
-          <a:xfrm>
-            <a:off x="3808475" y="2326213"/>
-            <a:ext cx="1463784" cy="526961"/>
-          </a:xfrm>
-          <a:prstGeom prst="rect">
-            <a:avLst/>
-          </a:prstGeom>
-          <a:noFill/>
-          <a:ln>
-            <a:noFill/>
-          </a:ln>
-          <a:extLst>
-            <a:ext uri="{909E8E84-426E-40DD-AFC4-6F175D3DCCD1}">
-              <a14:hiddenFill xmlns:a14="http://schemas.microsoft.com/office/drawing/2010/main">
-                <a:solidFill>
-                  <a:srgbClr val="FFFFFF"/>
-                </a:solidFill>
-              </a14:hiddenFill>
-            </a:ext>
-          </a:extLst>
-        </p:spPr>
-      </p:pic>
+      <p:sp>
+        <p:nvSpPr>
+          <p:cNvPr id="4" name="Title 3"/>
+          <p:cNvSpPr>
+            <a:spLocks noGrp="1"/>
+          </p:cNvSpPr>
+          <p:nvPr>
+            <p:ph type="title"/>
+          </p:nvPr>
+        </p:nvSpPr>
+        <p:spPr/>
+        <p:txBody>
+          <a:bodyPr>
+            <a:normAutofit/>
+          </a:bodyPr>
+          <a:lstStyle/>
+          <a:p>
+            <a:r>
+              <a:rPr lang="en-US" dirty="0"/>
+              <a:t>Pluralsight</a:t>
+            </a:r>
+          </a:p>
+        </p:txBody>
+      </p:sp>
+      <p:sp>
+        <p:nvSpPr>
+          <p:cNvPr id="5" name="Content Placeholder 4"/>
+          <p:cNvSpPr>
+            <a:spLocks noGrp="1"/>
+          </p:cNvSpPr>
+          <p:nvPr>
+            <p:ph idx="1"/>
+          </p:nvPr>
+        </p:nvSpPr>
+        <p:spPr/>
+        <p:txBody>
+          <a:bodyPr/>
+          <a:lstStyle/>
+          <a:p>
+            <a:r>
+              <a:rPr lang="en-US" dirty="0"/>
+              <a:t>OOP</a:t>
+            </a:r>
+          </a:p>
+          <a:p>
+            <a:r>
+              <a:rPr lang="en-US" dirty="0"/>
+              <a:t>Architecture &amp; Design</a:t>
+            </a:r>
+          </a:p>
+          <a:p>
+            <a:r>
+              <a:rPr lang="en-US" dirty="0" err="1"/>
+              <a:t>RxJS</a:t>
+            </a:r>
+            <a:endParaRPr lang="en-US" dirty="0"/>
+          </a:p>
+          <a:p>
+            <a:r>
+              <a:rPr lang="en-US" dirty="0"/>
+              <a:t>Unit Testing</a:t>
+            </a:r>
+          </a:p>
+          <a:p>
+            <a:r>
+              <a:rPr lang="en-US" dirty="0"/>
+              <a:t>HTTP Communication</a:t>
+            </a:r>
+          </a:p>
+          <a:p>
+            <a:endParaRPr lang="en-US" dirty="0"/>
+          </a:p>
+          <a:p>
+            <a:endParaRPr lang="en-US" dirty="0"/>
+          </a:p>
+        </p:txBody>
+      </p:sp>
     </p:spTree>
     <p:extLst>
       <p:ext uri="{BB962C8B-B14F-4D97-AF65-F5344CB8AC3E}">
-        <p14:creationId xmlns:p14="http://schemas.microsoft.com/office/powerpoint/2010/main" val="109100692"/>
+        <p14:creationId xmlns:p14="http://schemas.microsoft.com/office/powerpoint/2010/main" val="1240143068"/>
       </p:ext>
     </p:extLst>
   </p:cSld>

</xml_diff>